<commit_message>
template instead of master
</commit_message>
<xml_diff>
--- a/test/fullPresentation.pptx
+++ b/test/fullPresentation.pptx
@@ -3781,7 +3781,7 @@
               <a:defRPr sz="2200"/>
             </a:pPr>
             <a:r>
-              <a:t>md2pptx Markdown To Powerpoint Converter 0.9.1 10 October, 2020</a:t>
+              <a:t>md2pptx Markdown To Powerpoint Converter 1.1 14 October, 2020</a:t>
             </a:r>
             <a:endParaRPr lang="en-US"/>
           </a:p>
@@ -3810,7 +3810,7 @@
           <a:lstStyle/>
           <a:p>
             <a:r>
-              <a:t>Presentation built: 10:10 on 11 October, 2020</a:t>
+              <a:t>Presentation built: 12:35 on 14 October, 2020</a:t>
             </a:r>
           </a:p>
           <a:p>
@@ -3822,7 +3822,7 @@
           <a:p>
             <a:pPr lvl="1"/>
             <a:r>
-              <a:t>master: Martin Master.pptx</a:t>
+              <a:t>template: Martin Template.pptx</a:t>
             </a:r>
           </a:p>
           <a:p>

</xml_diff>